<commit_message>
Chinh sua bao cao, code
</commit_message>
<xml_diff>
--- a/thesis/abs/CSN-PhamTheVinh-110122208-DA22TTC.pptx
+++ b/thesis/abs/CSN-PhamTheVinh-110122208-DA22TTC.pptx
@@ -5,7 +5,7 @@
     <p:sldMasterId id="2147483648" r:id="rId1"/>
   </p:sldMasterIdLst>
   <p:notesMasterIdLst>
-    <p:notesMasterId r:id="rId10"/>
+    <p:notesMasterId r:id="rId13"/>
   </p:notesMasterIdLst>
   <p:sldIdLst>
     <p:sldId id="256" r:id="rId2"/>
@@ -16,6 +16,9 @@
     <p:sldId id="261" r:id="rId7"/>
     <p:sldId id="262" r:id="rId8"/>
     <p:sldId id="263" r:id="rId9"/>
+    <p:sldId id="264" r:id="rId10"/>
+    <p:sldId id="265" r:id="rId11"/>
+    <p:sldId id="266" r:id="rId12"/>
   </p:sldIdLst>
   <p:sldSz cx="12192000" cy="6858000"/>
   <p:notesSz cx="6858000" cy="9144000"/>
@@ -114,6 +117,11 @@
       </a:defRPr>
     </a:lvl9pPr>
   </p:defaultTextStyle>
+  <p:extLst>
+    <p:ext uri="{EFAFB233-063F-42B5-8137-9DF3F51BA10A}">
+      <p15:sldGuideLst xmlns:p15="http://schemas.microsoft.com/office/powerpoint/2012/main"/>
+    </p:ext>
+  </p:extLst>
 </p:presentation>
 </file>
 
@@ -199,7 +207,7 @@
           <a:p>
             <a:fld id="{99DE3781-6464-4166-9117-F22CC446FEC6}" type="datetimeFigureOut">
               <a:rPr lang="vi-VN" smtClean="0"/>
-              <a:t>27/12/2024</a:t>
+              <a:t>29/12/2024</a:t>
             </a:fld>
             <a:endParaRPr lang="vi-VN"/>
           </a:p>
@@ -803,6 +811,258 @@
 </p:notes>
 </file>
 
+<file path=ppt/notesSlides/notesSlide5.xml><?xml version="1.0" encoding="utf-8"?>
+<p:notes xmlns:a="http://schemas.openxmlformats.org/drawingml/2006/main" xmlns:r="http://schemas.openxmlformats.org/officeDocument/2006/relationships" xmlns:p="http://schemas.openxmlformats.org/presentationml/2006/main">
+  <p:cSld>
+    <p:spTree>
+      <p:nvGrpSpPr>
+        <p:cNvPr id="1" name=""/>
+        <p:cNvGrpSpPr/>
+        <p:nvPr/>
+      </p:nvGrpSpPr>
+      <p:grpSpPr>
+        <a:xfrm>
+          <a:off x="0" y="0"/>
+          <a:ext cx="0" cy="0"/>
+          <a:chOff x="0" y="0"/>
+          <a:chExt cx="0" cy="0"/>
+        </a:xfrm>
+      </p:grpSpPr>
+      <p:sp>
+        <p:nvSpPr>
+          <p:cNvPr id="2" name="Slide Image Placeholder 1"/>
+          <p:cNvSpPr>
+            <a:spLocks noGrp="1" noRot="1" noChangeAspect="1"/>
+          </p:cNvSpPr>
+          <p:nvPr>
+            <p:ph type="sldImg"/>
+          </p:nvPr>
+        </p:nvSpPr>
+        <p:spPr/>
+      </p:sp>
+      <p:sp>
+        <p:nvSpPr>
+          <p:cNvPr id="3" name="Notes Placeholder 2"/>
+          <p:cNvSpPr>
+            <a:spLocks noGrp="1"/>
+          </p:cNvSpPr>
+          <p:nvPr>
+            <p:ph type="body" idx="1"/>
+          </p:nvPr>
+        </p:nvSpPr>
+        <p:spPr/>
+        <p:txBody>
+          <a:bodyPr/>
+          <a:lstStyle/>
+          <a:p>
+            <a:endParaRPr lang="vi-VN"/>
+          </a:p>
+        </p:txBody>
+      </p:sp>
+      <p:sp>
+        <p:nvSpPr>
+          <p:cNvPr id="4" name="Slide Number Placeholder 3"/>
+          <p:cNvSpPr>
+            <a:spLocks noGrp="1"/>
+          </p:cNvSpPr>
+          <p:nvPr>
+            <p:ph type="sldNum" sz="quarter" idx="10"/>
+          </p:nvPr>
+        </p:nvSpPr>
+        <p:spPr/>
+        <p:txBody>
+          <a:bodyPr/>
+          <a:lstStyle/>
+          <a:p>
+            <a:fld id="{A88C98BB-1832-4D33-8C46-1D1C10DE5E82}" type="slidenum">
+              <a:rPr lang="vi-VN" smtClean="0"/>
+              <a:t>9</a:t>
+            </a:fld>
+            <a:endParaRPr lang="vi-VN"/>
+          </a:p>
+        </p:txBody>
+      </p:sp>
+    </p:spTree>
+    <p:extLst>
+      <p:ext uri="{BB962C8B-B14F-4D97-AF65-F5344CB8AC3E}">
+        <p14:creationId xmlns:p14="http://schemas.microsoft.com/office/powerpoint/2010/main" val="1967169049"/>
+      </p:ext>
+    </p:extLst>
+  </p:cSld>
+  <p:clrMapOvr>
+    <a:masterClrMapping/>
+  </p:clrMapOvr>
+</p:notes>
+</file>
+
+<file path=ppt/notesSlides/notesSlide6.xml><?xml version="1.0" encoding="utf-8"?>
+<p:notes xmlns:a="http://schemas.openxmlformats.org/drawingml/2006/main" xmlns:r="http://schemas.openxmlformats.org/officeDocument/2006/relationships" xmlns:p="http://schemas.openxmlformats.org/presentationml/2006/main">
+  <p:cSld>
+    <p:spTree>
+      <p:nvGrpSpPr>
+        <p:cNvPr id="1" name=""/>
+        <p:cNvGrpSpPr/>
+        <p:nvPr/>
+      </p:nvGrpSpPr>
+      <p:grpSpPr>
+        <a:xfrm>
+          <a:off x="0" y="0"/>
+          <a:ext cx="0" cy="0"/>
+          <a:chOff x="0" y="0"/>
+          <a:chExt cx="0" cy="0"/>
+        </a:xfrm>
+      </p:grpSpPr>
+      <p:sp>
+        <p:nvSpPr>
+          <p:cNvPr id="2" name="Slide Image Placeholder 1"/>
+          <p:cNvSpPr>
+            <a:spLocks noGrp="1" noRot="1" noChangeAspect="1"/>
+          </p:cNvSpPr>
+          <p:nvPr>
+            <p:ph type="sldImg"/>
+          </p:nvPr>
+        </p:nvSpPr>
+        <p:spPr/>
+      </p:sp>
+      <p:sp>
+        <p:nvSpPr>
+          <p:cNvPr id="3" name="Notes Placeholder 2"/>
+          <p:cNvSpPr>
+            <a:spLocks noGrp="1"/>
+          </p:cNvSpPr>
+          <p:nvPr>
+            <p:ph type="body" idx="1"/>
+          </p:nvPr>
+        </p:nvSpPr>
+        <p:spPr/>
+        <p:txBody>
+          <a:bodyPr/>
+          <a:lstStyle/>
+          <a:p>
+            <a:endParaRPr lang="vi-VN"/>
+          </a:p>
+        </p:txBody>
+      </p:sp>
+      <p:sp>
+        <p:nvSpPr>
+          <p:cNvPr id="4" name="Slide Number Placeholder 3"/>
+          <p:cNvSpPr>
+            <a:spLocks noGrp="1"/>
+          </p:cNvSpPr>
+          <p:nvPr>
+            <p:ph type="sldNum" sz="quarter" idx="10"/>
+          </p:nvPr>
+        </p:nvSpPr>
+        <p:spPr/>
+        <p:txBody>
+          <a:bodyPr/>
+          <a:lstStyle/>
+          <a:p>
+            <a:fld id="{A88C98BB-1832-4D33-8C46-1D1C10DE5E82}" type="slidenum">
+              <a:rPr lang="vi-VN" smtClean="0"/>
+              <a:t>10</a:t>
+            </a:fld>
+            <a:endParaRPr lang="vi-VN"/>
+          </a:p>
+        </p:txBody>
+      </p:sp>
+    </p:spTree>
+    <p:extLst>
+      <p:ext uri="{BB962C8B-B14F-4D97-AF65-F5344CB8AC3E}">
+        <p14:creationId xmlns:p14="http://schemas.microsoft.com/office/powerpoint/2010/main" val="3324658480"/>
+      </p:ext>
+    </p:extLst>
+  </p:cSld>
+  <p:clrMapOvr>
+    <a:masterClrMapping/>
+  </p:clrMapOvr>
+</p:notes>
+</file>
+
+<file path=ppt/notesSlides/notesSlide7.xml><?xml version="1.0" encoding="utf-8"?>
+<p:notes xmlns:a="http://schemas.openxmlformats.org/drawingml/2006/main" xmlns:r="http://schemas.openxmlformats.org/officeDocument/2006/relationships" xmlns:p="http://schemas.openxmlformats.org/presentationml/2006/main">
+  <p:cSld>
+    <p:spTree>
+      <p:nvGrpSpPr>
+        <p:cNvPr id="1" name=""/>
+        <p:cNvGrpSpPr/>
+        <p:nvPr/>
+      </p:nvGrpSpPr>
+      <p:grpSpPr>
+        <a:xfrm>
+          <a:off x="0" y="0"/>
+          <a:ext cx="0" cy="0"/>
+          <a:chOff x="0" y="0"/>
+          <a:chExt cx="0" cy="0"/>
+        </a:xfrm>
+      </p:grpSpPr>
+      <p:sp>
+        <p:nvSpPr>
+          <p:cNvPr id="2" name="Slide Image Placeholder 1"/>
+          <p:cNvSpPr>
+            <a:spLocks noGrp="1" noRot="1" noChangeAspect="1"/>
+          </p:cNvSpPr>
+          <p:nvPr>
+            <p:ph type="sldImg"/>
+          </p:nvPr>
+        </p:nvSpPr>
+        <p:spPr/>
+      </p:sp>
+      <p:sp>
+        <p:nvSpPr>
+          <p:cNvPr id="3" name="Notes Placeholder 2"/>
+          <p:cNvSpPr>
+            <a:spLocks noGrp="1"/>
+          </p:cNvSpPr>
+          <p:nvPr>
+            <p:ph type="body" idx="1"/>
+          </p:nvPr>
+        </p:nvSpPr>
+        <p:spPr/>
+        <p:txBody>
+          <a:bodyPr/>
+          <a:lstStyle/>
+          <a:p>
+            <a:endParaRPr lang="vi-VN"/>
+          </a:p>
+        </p:txBody>
+      </p:sp>
+      <p:sp>
+        <p:nvSpPr>
+          <p:cNvPr id="4" name="Slide Number Placeholder 3"/>
+          <p:cNvSpPr>
+            <a:spLocks noGrp="1"/>
+          </p:cNvSpPr>
+          <p:nvPr>
+            <p:ph type="sldNum" sz="quarter" idx="10"/>
+          </p:nvPr>
+        </p:nvSpPr>
+        <p:spPr/>
+        <p:txBody>
+          <a:bodyPr/>
+          <a:lstStyle/>
+          <a:p>
+            <a:fld id="{A88C98BB-1832-4D33-8C46-1D1C10DE5E82}" type="slidenum">
+              <a:rPr lang="vi-VN" smtClean="0"/>
+              <a:t>11</a:t>
+            </a:fld>
+            <a:endParaRPr lang="vi-VN"/>
+          </a:p>
+        </p:txBody>
+      </p:sp>
+    </p:spTree>
+    <p:extLst>
+      <p:ext uri="{BB962C8B-B14F-4D97-AF65-F5344CB8AC3E}">
+        <p14:creationId xmlns:p14="http://schemas.microsoft.com/office/powerpoint/2010/main" val="2486067840"/>
+      </p:ext>
+    </p:extLst>
+  </p:cSld>
+  <p:clrMapOvr>
+    <a:masterClrMapping/>
+  </p:clrMapOvr>
+</p:notes>
+</file>
+
 <file path=ppt/slideLayouts/slideLayout1.xml><?xml version="1.0" encoding="utf-8"?>
 <p:sldLayout xmlns:a="http://schemas.openxmlformats.org/drawingml/2006/main" xmlns:r="http://schemas.openxmlformats.org/officeDocument/2006/relationships" xmlns:p="http://schemas.openxmlformats.org/presentationml/2006/main" type="title" preserve="1">
   <p:cSld name="Title Slide">
@@ -934,7 +1194,7 @@
           <a:p>
             <a:fld id="{9A41B56A-32E6-445F-B440-40B15412FE4E}" type="datetimeFigureOut">
               <a:rPr lang="vi-VN" smtClean="0"/>
-              <a:t>27/12/2024</a:t>
+              <a:t>29/12/2024</a:t>
             </a:fld>
             <a:endParaRPr lang="vi-VN"/>
           </a:p>
@@ -1104,7 +1364,7 @@
           <a:p>
             <a:fld id="{9A41B56A-32E6-445F-B440-40B15412FE4E}" type="datetimeFigureOut">
               <a:rPr lang="vi-VN" smtClean="0"/>
-              <a:t>27/12/2024</a:t>
+              <a:t>29/12/2024</a:t>
             </a:fld>
             <a:endParaRPr lang="vi-VN"/>
           </a:p>
@@ -1284,7 +1544,7 @@
           <a:p>
             <a:fld id="{9A41B56A-32E6-445F-B440-40B15412FE4E}" type="datetimeFigureOut">
               <a:rPr lang="vi-VN" smtClean="0"/>
-              <a:t>27/12/2024</a:t>
+              <a:t>29/12/2024</a:t>
             </a:fld>
             <a:endParaRPr lang="vi-VN"/>
           </a:p>
@@ -1454,7 +1714,7 @@
           <a:p>
             <a:fld id="{9A41B56A-32E6-445F-B440-40B15412FE4E}" type="datetimeFigureOut">
               <a:rPr lang="vi-VN" smtClean="0"/>
-              <a:t>27/12/2024</a:t>
+              <a:t>29/12/2024</a:t>
             </a:fld>
             <a:endParaRPr lang="vi-VN"/>
           </a:p>
@@ -1700,7 +1960,7 @@
           <a:p>
             <a:fld id="{9A41B56A-32E6-445F-B440-40B15412FE4E}" type="datetimeFigureOut">
               <a:rPr lang="vi-VN" smtClean="0"/>
-              <a:t>27/12/2024</a:t>
+              <a:t>29/12/2024</a:t>
             </a:fld>
             <a:endParaRPr lang="vi-VN"/>
           </a:p>
@@ -1932,7 +2192,7 @@
           <a:p>
             <a:fld id="{9A41B56A-32E6-445F-B440-40B15412FE4E}" type="datetimeFigureOut">
               <a:rPr lang="vi-VN" smtClean="0"/>
-              <a:t>27/12/2024</a:t>
+              <a:t>29/12/2024</a:t>
             </a:fld>
             <a:endParaRPr lang="vi-VN"/>
           </a:p>
@@ -2299,7 +2559,7 @@
           <a:p>
             <a:fld id="{9A41B56A-32E6-445F-B440-40B15412FE4E}" type="datetimeFigureOut">
               <a:rPr lang="vi-VN" smtClean="0"/>
-              <a:t>27/12/2024</a:t>
+              <a:t>29/12/2024</a:t>
             </a:fld>
             <a:endParaRPr lang="vi-VN"/>
           </a:p>
@@ -2417,7 +2677,7 @@
           <a:p>
             <a:fld id="{9A41B56A-32E6-445F-B440-40B15412FE4E}" type="datetimeFigureOut">
               <a:rPr lang="vi-VN" smtClean="0"/>
-              <a:t>27/12/2024</a:t>
+              <a:t>29/12/2024</a:t>
             </a:fld>
             <a:endParaRPr lang="vi-VN"/>
           </a:p>
@@ -2512,7 +2772,7 @@
           <a:p>
             <a:fld id="{9A41B56A-32E6-445F-B440-40B15412FE4E}" type="datetimeFigureOut">
               <a:rPr lang="vi-VN" smtClean="0"/>
-              <a:t>27/12/2024</a:t>
+              <a:t>29/12/2024</a:t>
             </a:fld>
             <a:endParaRPr lang="vi-VN"/>
           </a:p>
@@ -2789,7 +3049,7 @@
           <a:p>
             <a:fld id="{9A41B56A-32E6-445F-B440-40B15412FE4E}" type="datetimeFigureOut">
               <a:rPr lang="vi-VN" smtClean="0"/>
-              <a:t>27/12/2024</a:t>
+              <a:t>29/12/2024</a:t>
             </a:fld>
             <a:endParaRPr lang="vi-VN"/>
           </a:p>
@@ -3042,7 +3302,7 @@
           <a:p>
             <a:fld id="{9A41B56A-32E6-445F-B440-40B15412FE4E}" type="datetimeFigureOut">
               <a:rPr lang="vi-VN" smtClean="0"/>
-              <a:t>27/12/2024</a:t>
+              <a:t>29/12/2024</a:t>
             </a:fld>
             <a:endParaRPr lang="vi-VN"/>
           </a:p>
@@ -3264,7 +3524,7 @@
           <a:p>
             <a:fld id="{9A41B56A-32E6-445F-B440-40B15412FE4E}" type="datetimeFigureOut">
               <a:rPr lang="vi-VN" smtClean="0"/>
-              <a:t>27/12/2024</a:t>
+              <a:t>29/12/2024</a:t>
             </a:fld>
             <a:endParaRPr lang="vi-VN"/>
           </a:p>
@@ -3709,11 +3969,7 @@
             </a:br>
             <a:r>
               <a:rPr lang="en-US" sz="2800" b="1"/>
-              <a:t>HỌC KỲ I, NĂM HỌC 2024 </a:t>
-            </a:r>
-            <a:r>
-              <a:rPr lang="en-US" sz="2800" b="1"/>
-              <a:t>- </a:t>
+              <a:t>HỌC KỲ I, NĂM HỌC 2024 - </a:t>
             </a:r>
             <a:r>
               <a:rPr lang="en-US" sz="2800" b="1" smtClean="0"/>
@@ -3774,11 +4030,7 @@
             </a:pPr>
             <a:r>
               <a:rPr lang="en-US"/>
-              <a:t>TS. Nguyễn Trần </a:t>
-            </a:r>
-            <a:r>
-              <a:rPr lang="en-US"/>
-              <a:t>Diễm </a:t>
+              <a:t>TS. Nguyễn Trần Diễm </a:t>
             </a:r>
             <a:r>
               <a:rPr lang="en-US" smtClean="0"/>
@@ -3922,7 +4174,7 @@
         </p:blipFill>
         <p:spPr bwMode="auto">
           <a:xfrm>
-            <a:off x="1796376" y="373141"/>
+            <a:off x="624000" y="310719"/>
             <a:ext cx="900000" cy="900000"/>
           </a:xfrm>
           <a:prstGeom prst="ellipse">
@@ -3986,11 +4238,7 @@
             <a:pPr algn="ctr"/>
             <a:r>
               <a:rPr lang="en-US" sz="2800" b="1"/>
-              <a:t>BỘ MÔN CÔNG NGHỆ </a:t>
-            </a:r>
-            <a:r>
-              <a:rPr lang="en-US" sz="2800" b="1"/>
-              <a:t>THÔNG </a:t>
+              <a:t>BỘ MÔN CÔNG NGHỆ THÔNG </a:t>
             </a:r>
             <a:r>
               <a:rPr lang="en-US" sz="2800" b="1" smtClean="0"/>
@@ -4073,6 +4321,255 @@
     <p:extLst>
       <p:ext uri="{BB962C8B-B14F-4D97-AF65-F5344CB8AC3E}">
         <p14:creationId xmlns:p14="http://schemas.microsoft.com/office/powerpoint/2010/main" val="2551105171"/>
+      </p:ext>
+    </p:extLst>
+  </p:cSld>
+  <p:clrMapOvr>
+    <a:masterClrMapping/>
+  </p:clrMapOvr>
+  <p:timing>
+    <p:tnLst>
+      <p:par>
+        <p:cTn id="1" dur="indefinite" restart="never" nodeType="tmRoot"/>
+      </p:par>
+    </p:tnLst>
+  </p:timing>
+</p:sld>
+</file>
+
+<file path=ppt/slides/slide10.xml><?xml version="1.0" encoding="utf-8"?>
+<p:sld xmlns:a="http://schemas.openxmlformats.org/drawingml/2006/main" xmlns:r="http://schemas.openxmlformats.org/officeDocument/2006/relationships" xmlns:p="http://schemas.openxmlformats.org/presentationml/2006/main">
+  <p:cSld>
+    <p:spTree>
+      <p:nvGrpSpPr>
+        <p:cNvPr id="1" name=""/>
+        <p:cNvGrpSpPr/>
+        <p:nvPr/>
+      </p:nvGrpSpPr>
+      <p:grpSpPr>
+        <a:xfrm>
+          <a:off x="0" y="0"/>
+          <a:ext cx="0" cy="0"/>
+          <a:chOff x="0" y="0"/>
+          <a:chExt cx="0" cy="0"/>
+        </a:xfrm>
+      </p:grpSpPr>
+      <p:sp>
+        <p:nvSpPr>
+          <p:cNvPr id="2" name="Title 1"/>
+          <p:cNvSpPr>
+            <a:spLocks noGrp="1"/>
+          </p:cNvSpPr>
+          <p:nvPr>
+            <p:ph type="title"/>
+          </p:nvPr>
+        </p:nvSpPr>
+        <p:spPr/>
+        <p:txBody>
+          <a:bodyPr>
+            <a:normAutofit/>
+          </a:bodyPr>
+          <a:lstStyle/>
+          <a:p>
+            <a:pPr algn="ctr">
+              <a:lnSpc>
+                <a:spcPct val="100000"/>
+              </a:lnSpc>
+              <a:spcBef>
+                <a:spcPts val="0"/>
+              </a:spcBef>
+            </a:pPr>
+            <a:r>
+              <a:rPr lang="en-US" sz="4000" b="1" smtClean="0"/>
+              <a:t>KẾT LUẬN VÀ HƯỚNG PHÁT TRIỂN</a:t>
+            </a:r>
+            <a:endParaRPr lang="vi-VN" sz="4000" b="1"/>
+          </a:p>
+        </p:txBody>
+      </p:sp>
+      <p:sp>
+        <p:nvSpPr>
+          <p:cNvPr id="12" name="Content Placeholder 11"/>
+          <p:cNvSpPr>
+            <a:spLocks noGrp="1"/>
+          </p:cNvSpPr>
+          <p:nvPr>
+            <p:ph idx="1"/>
+          </p:nvPr>
+        </p:nvSpPr>
+        <p:spPr>
+          <a:xfrm>
+            <a:off x="838200" y="1825624"/>
+            <a:ext cx="10515600" cy="4964282"/>
+          </a:xfrm>
+        </p:spPr>
+        <p:txBody>
+          <a:bodyPr>
+            <a:normAutofit/>
+          </a:bodyPr>
+          <a:lstStyle/>
+          <a:p>
+            <a:pPr>
+              <a:buFont typeface="Wingdings" panose="05000000000000000000" pitchFamily="2" charset="2"/>
+              <a:buChar char="q"/>
+            </a:pPr>
+            <a:r>
+              <a:rPr lang="vi-VN" smtClean="0"/>
+              <a:t> </a:t>
+            </a:r>
+            <a:r>
+              <a:rPr lang="vi-VN" b="1" smtClean="0"/>
+              <a:t>Hướng phát triển</a:t>
+            </a:r>
+            <a:endParaRPr lang="vi-VN" b="1" smtClean="0"/>
+          </a:p>
+          <a:p>
+            <a:pPr marL="673200" indent="-457200">
+              <a:lnSpc>
+                <a:spcPct val="150000"/>
+              </a:lnSpc>
+              <a:spcBef>
+                <a:spcPts val="0"/>
+              </a:spcBef>
+              <a:buFont typeface="Wingdings" panose="05000000000000000000" pitchFamily="2" charset="2"/>
+              <a:buChar char="ü"/>
+            </a:pPr>
+            <a:r>
+              <a:rPr lang="vi-VN" sz="3000" smtClean="0"/>
+              <a:t>Chuyển sang giao diện đồ họa</a:t>
+            </a:r>
+          </a:p>
+          <a:p>
+            <a:pPr marL="673200" indent="-457200">
+              <a:lnSpc>
+                <a:spcPct val="150000"/>
+              </a:lnSpc>
+              <a:spcBef>
+                <a:spcPts val="0"/>
+              </a:spcBef>
+              <a:buFont typeface="Wingdings" panose="05000000000000000000" pitchFamily="2" charset="2"/>
+              <a:buChar char="ü"/>
+            </a:pPr>
+            <a:r>
+              <a:rPr lang="vi-VN" sz="3000" smtClean="0"/>
+              <a:t>Lưu trữ thông tin vào cơ sở dữ liệu</a:t>
+            </a:r>
+            <a:endParaRPr lang="vi-VN" sz="3000"/>
+          </a:p>
+          <a:p>
+            <a:pPr marL="673200" indent="-457200">
+              <a:lnSpc>
+                <a:spcPct val="150000"/>
+              </a:lnSpc>
+              <a:spcBef>
+                <a:spcPts val="0"/>
+              </a:spcBef>
+              <a:buFont typeface="Wingdings" panose="05000000000000000000" pitchFamily="2" charset="2"/>
+              <a:buChar char="ü"/>
+            </a:pPr>
+            <a:r>
+              <a:rPr lang="vi-VN" sz="3000" smtClean="0"/>
+              <a:t>Bổ sung tính năng tìm kiếm nâng cao </a:t>
+            </a:r>
+            <a:endParaRPr lang="vi-VN" sz="3000"/>
+          </a:p>
+          <a:p>
+            <a:pPr marL="673200" indent="-457200">
+              <a:lnSpc>
+                <a:spcPct val="150000"/>
+              </a:lnSpc>
+              <a:spcBef>
+                <a:spcPts val="0"/>
+              </a:spcBef>
+              <a:buFont typeface="Wingdings" panose="05000000000000000000" pitchFamily="2" charset="2"/>
+              <a:buChar char="ü"/>
+            </a:pPr>
+            <a:r>
+              <a:rPr lang="vi-VN" sz="3000" smtClean="0"/>
+              <a:t>Phát triển chức năng nhắc nhở và thông báo</a:t>
+            </a:r>
+          </a:p>
+        </p:txBody>
+      </p:sp>
+    </p:spTree>
+    <p:extLst>
+      <p:ext uri="{BB962C8B-B14F-4D97-AF65-F5344CB8AC3E}">
+        <p14:creationId xmlns:p14="http://schemas.microsoft.com/office/powerpoint/2010/main" val="2617172824"/>
+      </p:ext>
+    </p:extLst>
+  </p:cSld>
+  <p:clrMapOvr>
+    <a:masterClrMapping/>
+  </p:clrMapOvr>
+  <p:timing>
+    <p:tnLst>
+      <p:par>
+        <p:cTn id="1" dur="indefinite" restart="never" nodeType="tmRoot"/>
+      </p:par>
+    </p:tnLst>
+  </p:timing>
+</p:sld>
+</file>
+
+<file path=ppt/slides/slide11.xml><?xml version="1.0" encoding="utf-8"?>
+<p:sld xmlns:a="http://schemas.openxmlformats.org/drawingml/2006/main" xmlns:r="http://schemas.openxmlformats.org/officeDocument/2006/relationships" xmlns:p="http://schemas.openxmlformats.org/presentationml/2006/main">
+  <p:cSld>
+    <p:spTree>
+      <p:nvGrpSpPr>
+        <p:cNvPr id="1" name=""/>
+        <p:cNvGrpSpPr/>
+        <p:nvPr/>
+      </p:nvGrpSpPr>
+      <p:grpSpPr>
+        <a:xfrm>
+          <a:off x="0" y="0"/>
+          <a:ext cx="0" cy="0"/>
+          <a:chOff x="0" y="0"/>
+          <a:chExt cx="0" cy="0"/>
+        </a:xfrm>
+      </p:grpSpPr>
+      <p:sp>
+        <p:nvSpPr>
+          <p:cNvPr id="2" name="Title 1"/>
+          <p:cNvSpPr>
+            <a:spLocks noGrp="1"/>
+          </p:cNvSpPr>
+          <p:nvPr>
+            <p:ph type="title"/>
+          </p:nvPr>
+        </p:nvSpPr>
+        <p:spPr>
+          <a:xfrm>
+            <a:off x="0" y="2573304"/>
+            <a:ext cx="12192000" cy="1325563"/>
+          </a:xfrm>
+        </p:spPr>
+        <p:txBody>
+          <a:bodyPr>
+            <a:normAutofit/>
+          </a:bodyPr>
+          <a:lstStyle/>
+          <a:p>
+            <a:pPr algn="ctr">
+              <a:lnSpc>
+                <a:spcPct val="100000"/>
+              </a:lnSpc>
+              <a:spcBef>
+                <a:spcPts val="0"/>
+              </a:spcBef>
+            </a:pPr>
+            <a:r>
+              <a:rPr lang="en-US" sz="4800" b="1" smtClean="0"/>
+              <a:t>Xin chân thành cảm ơn!</a:t>
+            </a:r>
+            <a:endParaRPr lang="vi-VN" sz="4800" b="1"/>
+          </a:p>
+        </p:txBody>
+      </p:sp>
+    </p:spTree>
+    <p:extLst>
+      <p:ext uri="{BB962C8B-B14F-4D97-AF65-F5344CB8AC3E}">
+        <p14:creationId xmlns:p14="http://schemas.microsoft.com/office/powerpoint/2010/main" val="4270551029"/>
       </p:ext>
     </p:extLst>
   </p:cSld>
@@ -4123,7 +4620,11 @@
           </a:bodyPr>
           <a:lstStyle/>
           <a:p>
-            <a:pPr algn="ctr"/>
+            <a:pPr algn="ctr">
+              <a:lnSpc>
+                <a:spcPct val="100000"/>
+              </a:lnSpc>
+            </a:pPr>
             <a:r>
               <a:rPr lang="en-US" sz="4000" b="1" smtClean="0"/>
               <a:t>NỘI DUNG</a:t>
@@ -4199,11 +4700,7 @@
             </a:pPr>
             <a:r>
               <a:rPr lang="en-US" sz="3000" smtClean="0"/>
-              <a:t>Mô hình và kết quả </a:t>
-            </a:r>
-            <a:r>
-              <a:rPr lang="en-US" sz="3000" smtClean="0"/>
-              <a:t>nghiên cứu</a:t>
+              <a:t>Mô hình và kết quả nghiên cứu</a:t>
             </a:r>
           </a:p>
           <a:p>
@@ -4309,7 +4806,11 @@
           </a:bodyPr>
           <a:lstStyle/>
           <a:p>
-            <a:pPr algn="ctr"/>
+            <a:pPr algn="ctr">
+              <a:lnSpc>
+                <a:spcPct val="100000"/>
+              </a:lnSpc>
+            </a:pPr>
             <a:r>
               <a:rPr lang="en-US" sz="4000" b="1" smtClean="0"/>
               <a:t>TỔNG QUAN ĐỀ TÀI</a:t>
@@ -4505,7 +5006,11 @@
           </a:bodyPr>
           <a:lstStyle/>
           <a:p>
-            <a:pPr algn="ctr"/>
+            <a:pPr algn="ctr">
+              <a:lnSpc>
+                <a:spcPct val="100000"/>
+              </a:lnSpc>
+            </a:pPr>
             <a:r>
               <a:rPr lang="en-US" sz="4000" b="1" smtClean="0"/>
               <a:t>TỔNG QUAN ĐỀ TÀI</a:t>
@@ -4564,11 +5069,7 @@
             </a:pPr>
             <a:r>
               <a:rPr lang="en-US" sz="3000"/>
-              <a:t>Quản lý danh </a:t>
-            </a:r>
-            <a:r>
-              <a:rPr lang="en-US" sz="3000"/>
-              <a:t>mục </a:t>
+              <a:t>Quản lý danh mục </a:t>
             </a:r>
             <a:r>
               <a:rPr lang="en-US" sz="3000" smtClean="0"/>
@@ -4576,11 +5077,7 @@
             </a:r>
             <a:r>
               <a:rPr lang="en-US" sz="3000"/>
-              <a:t>các </a:t>
-            </a:r>
-            <a:r>
-              <a:rPr lang="en-US" sz="3000"/>
-              <a:t>sản </a:t>
+              <a:t>các sản </a:t>
             </a:r>
             <a:r>
               <a:rPr lang="en-US" sz="3000" smtClean="0"/>
@@ -4601,11 +5098,7 @@
             </a:pPr>
             <a:r>
               <a:rPr lang="en-US" sz="3000"/>
-              <a:t>Quản lý </a:t>
-            </a:r>
-            <a:r>
-              <a:rPr lang="en-US" sz="3000"/>
-              <a:t>danh </a:t>
+              <a:t>Quản lý danh </a:t>
             </a:r>
             <a:r>
               <a:rPr lang="en-US" sz="3000" smtClean="0"/>
@@ -4637,11 +5130,7 @@
             </a:r>
             <a:r>
               <a:rPr lang="en-US" sz="3000"/>
-              <a:t>lý danh mục thành </a:t>
-            </a:r>
-            <a:r>
-              <a:rPr lang="en-US" sz="3000"/>
-              <a:t>phần </a:t>
+              <a:t>lý danh mục thành phần </a:t>
             </a:r>
             <a:r>
               <a:rPr lang="en-US" sz="3000" smtClean="0"/>
@@ -4666,11 +5155,7 @@
             </a:pPr>
             <a:r>
               <a:rPr lang="en-US" sz="3000"/>
-              <a:t>Quản lý danh </a:t>
-            </a:r>
-            <a:r>
-              <a:rPr lang="en-US" sz="3000"/>
-              <a:t>mục </a:t>
+              <a:t>Quản lý danh mục </a:t>
             </a:r>
             <a:r>
               <a:rPr lang="en-US" sz="3000" smtClean="0"/>
@@ -4678,11 +5163,7 @@
             </a:r>
             <a:r>
               <a:rPr lang="en-US" sz="3000"/>
-              <a:t>dụng của từng </a:t>
-            </a:r>
-            <a:r>
-              <a:rPr lang="en-US" sz="3000"/>
-              <a:t>sản </a:t>
+              <a:t>dụng của từng sản </a:t>
             </a:r>
             <a:r>
               <a:rPr lang="en-US" sz="3000" smtClean="0"/>
@@ -4703,11 +5184,7 @@
             </a:pPr>
             <a:r>
               <a:rPr lang="en-US" sz="3000"/>
-              <a:t>Quản lý danh </a:t>
-            </a:r>
-            <a:r>
-              <a:rPr lang="en-US" sz="3000"/>
-              <a:t>mục </a:t>
+              <a:t>Quản lý danh mục </a:t>
             </a:r>
             <a:r>
               <a:rPr lang="en-US" sz="3000" smtClean="0"/>
@@ -4740,11 +5217,7 @@
             </a:pPr>
             <a:r>
               <a:rPr lang="en-US" sz="3000"/>
-              <a:t>Quản lý danh mục thương </a:t>
-            </a:r>
-            <a:r>
-              <a:rPr lang="en-US" sz="3000"/>
-              <a:t>hiệu </a:t>
+              <a:t>Quản lý danh mục thương hiệu </a:t>
             </a:r>
             <a:r>
               <a:rPr lang="en-US" sz="3000" smtClean="0"/>
@@ -4752,11 +5225,7 @@
             </a:r>
             <a:r>
               <a:rPr lang="en-US" sz="3000"/>
-              <a:t>sản xuất </a:t>
-            </a:r>
-            <a:r>
-              <a:rPr lang="en-US" sz="3000"/>
-              <a:t>sản </a:t>
+              <a:t>sản xuất sản </a:t>
             </a:r>
             <a:r>
               <a:rPr lang="en-US" sz="3000" smtClean="0"/>
@@ -4813,14 +5282,23 @@
             <p:ph type="title"/>
           </p:nvPr>
         </p:nvSpPr>
-        <p:spPr/>
+        <p:spPr>
+          <a:xfrm>
+            <a:off x="838200" y="306760"/>
+            <a:ext cx="10515600" cy="1325563"/>
+          </a:xfrm>
+        </p:spPr>
         <p:txBody>
           <a:bodyPr>
             <a:normAutofit/>
           </a:bodyPr>
           <a:lstStyle/>
           <a:p>
-            <a:pPr algn="ctr"/>
+            <a:pPr algn="ctr">
+              <a:lnSpc>
+                <a:spcPct val="100000"/>
+              </a:lnSpc>
+            </a:pPr>
             <a:r>
               <a:rPr lang="en-US" sz="4000" b="1" smtClean="0"/>
               <a:t>PHƯƠNG PHÁP THỰC HIỆN</a:t>
@@ -4967,7 +5445,11 @@
           </a:bodyPr>
           <a:lstStyle/>
           <a:p>
-            <a:pPr algn="ctr"/>
+            <a:pPr algn="ctr">
+              <a:lnSpc>
+                <a:spcPct val="100000"/>
+              </a:lnSpc>
+            </a:pPr>
             <a:r>
               <a:rPr lang="en-US" sz="4000" b="1" smtClean="0"/>
               <a:t>MÔ HÌNH VÀ KẾT QUẢ NGHIÊN CỨU</a:t>
@@ -5094,7 +5576,11 @@
           </a:bodyPr>
           <a:lstStyle/>
           <a:p>
-            <a:pPr algn="ctr"/>
+            <a:pPr algn="ctr">
+              <a:lnSpc>
+                <a:spcPct val="100000"/>
+              </a:lnSpc>
+            </a:pPr>
             <a:r>
               <a:rPr lang="en-US" sz="4000" b="1" smtClean="0"/>
               <a:t>MÔ HÌNH VÀ KẾT QUẢ NGHIÊN CỨU</a:t>
@@ -5221,7 +5707,11 @@
           </a:bodyPr>
           <a:lstStyle/>
           <a:p>
-            <a:pPr algn="ctr"/>
+            <a:pPr algn="ctr">
+              <a:lnSpc>
+                <a:spcPct val="100000"/>
+              </a:lnSpc>
+            </a:pPr>
             <a:r>
               <a:rPr lang="en-US" sz="4000" b="1" smtClean="0"/>
               <a:t>MÔ HÌNH VÀ KẾT QUẢ NGHIÊN CỨU</a:t>
@@ -5255,18 +5745,334 @@
             </a:r>
             <a:r>
               <a:rPr lang="vi-VN" b="1" smtClean="0"/>
-              <a:t>Kết quả nghiên cứu</a:t>
-            </a:r>
-            <a:endParaRPr lang="vi-VN" b="1"/>
-          </a:p>
+              <a:t>Kết quả nghiên </a:t>
+            </a:r>
+            <a:r>
+              <a:rPr lang="vi-VN" b="1" smtClean="0"/>
+              <a:t>cứu</a:t>
+            </a:r>
+          </a:p>
+          <a:p>
+            <a:pPr marL="673200" indent="-457200">
+              <a:lnSpc>
+                <a:spcPct val="150000"/>
+              </a:lnSpc>
+              <a:spcBef>
+                <a:spcPts val="0"/>
+              </a:spcBef>
+              <a:buFont typeface="Wingdings" panose="05000000000000000000" pitchFamily="2" charset="2"/>
+              <a:buChar char="ü"/>
+            </a:pPr>
+            <a:r>
+              <a:rPr lang="vi-VN" sz="3000"/>
+              <a:t>Ứng dụng ngôn ngữ C# và .Net </a:t>
+            </a:r>
+            <a:r>
+              <a:rPr lang="vi-VN" sz="3000"/>
+              <a:t>Framework </a:t>
+            </a:r>
+            <a:r>
+              <a:rPr lang="vi-VN" sz="3000" smtClean="0"/>
+              <a:t>trên nền OOP</a:t>
+            </a:r>
+          </a:p>
+          <a:p>
+            <a:pPr marL="673200" indent="-457200">
+              <a:lnSpc>
+                <a:spcPct val="150000"/>
+              </a:lnSpc>
+              <a:spcBef>
+                <a:spcPts val="0"/>
+              </a:spcBef>
+              <a:buFont typeface="Wingdings" panose="05000000000000000000" pitchFamily="2" charset="2"/>
+              <a:buChar char="ü"/>
+            </a:pPr>
+            <a:r>
+              <a:rPr lang="vi-VN" sz="3000" smtClean="0"/>
+              <a:t>Xây </a:t>
+            </a:r>
+            <a:r>
+              <a:rPr lang="vi-VN" sz="3000"/>
+              <a:t>dựng thành công </a:t>
+            </a:r>
+            <a:r>
+              <a:rPr lang="vi-VN" sz="3000"/>
+              <a:t>ứng </a:t>
+            </a:r>
+            <a:r>
+              <a:rPr lang="vi-VN" sz="3000" smtClean="0"/>
+              <a:t>dụng giao diện Console</a:t>
+            </a:r>
+            <a:endParaRPr lang="vi-VN" sz="3000"/>
+          </a:p>
+          <a:p>
+            <a:pPr marL="673200" indent="-457200">
+              <a:lnSpc>
+                <a:spcPct val="150000"/>
+              </a:lnSpc>
+              <a:spcBef>
+                <a:spcPts val="0"/>
+              </a:spcBef>
+              <a:buFont typeface="Wingdings" panose="05000000000000000000" pitchFamily="2" charset="2"/>
+              <a:buChar char="ü"/>
+            </a:pPr>
+            <a:r>
+              <a:rPr lang="vi-VN" sz="3000"/>
+              <a:t>Giải </a:t>
+            </a:r>
+            <a:r>
+              <a:rPr lang="vi-VN" sz="3000" smtClean="0"/>
+              <a:t>quyết các </a:t>
+            </a:r>
+            <a:r>
+              <a:rPr lang="vi-VN" sz="3000"/>
+              <a:t>yêu cầu </a:t>
+            </a:r>
+            <a:r>
+              <a:rPr lang="vi-VN" sz="3000"/>
+              <a:t>chức </a:t>
+            </a:r>
+            <a:r>
+              <a:rPr lang="vi-VN" sz="3000" smtClean="0"/>
+              <a:t>năng đã đặt ra</a:t>
+            </a:r>
+          </a:p>
+          <a:p>
+            <a:pPr marL="673200" indent="-457200">
+              <a:lnSpc>
+                <a:spcPct val="150000"/>
+              </a:lnSpc>
+              <a:spcBef>
+                <a:spcPts val="0"/>
+              </a:spcBef>
+              <a:buFont typeface="Wingdings" panose="05000000000000000000" pitchFamily="2" charset="2"/>
+              <a:buChar char="ü"/>
+            </a:pPr>
+            <a:r>
+              <a:rPr lang="vi-VN" sz="3000" smtClean="0"/>
+              <a:t>Tích lũy kỹ năng và kinh nghiệp lập trình</a:t>
+            </a:r>
+            <a:endParaRPr lang="vi-VN" sz="3000"/>
+          </a:p>
+          <a:p>
+            <a:pPr marL="673200" indent="-457200">
+              <a:lnSpc>
+                <a:spcPct val="150000"/>
+              </a:lnSpc>
+              <a:spcBef>
+                <a:spcPts val="0"/>
+              </a:spcBef>
+              <a:buFont typeface="Wingdings" panose="05000000000000000000" pitchFamily="2" charset="2"/>
+              <a:buChar char="ü"/>
+            </a:pPr>
+            <a:endParaRPr lang="vi-VN" sz="3000" smtClean="0"/>
+          </a:p>
+        </p:txBody>
+      </p:sp>
+    </p:spTree>
+    <p:extLst>
+      <p:ext uri="{BB962C8B-B14F-4D97-AF65-F5344CB8AC3E}">
+        <p14:creationId xmlns:p14="http://schemas.microsoft.com/office/powerpoint/2010/main" val="1695831539"/>
+      </p:ext>
+    </p:extLst>
+  </p:cSld>
+  <p:clrMapOvr>
+    <a:masterClrMapping/>
+  </p:clrMapOvr>
+  <p:timing>
+    <p:tnLst>
+      <p:par>
+        <p:cTn id="1" dur="indefinite" restart="never" nodeType="tmRoot"/>
+      </p:par>
+    </p:tnLst>
+  </p:timing>
+</p:sld>
+</file>
+
+<file path=ppt/slides/slide9.xml><?xml version="1.0" encoding="utf-8"?>
+<p:sld xmlns:a="http://schemas.openxmlformats.org/drawingml/2006/main" xmlns:r="http://schemas.openxmlformats.org/officeDocument/2006/relationships" xmlns:p="http://schemas.openxmlformats.org/presentationml/2006/main">
+  <p:cSld>
+    <p:spTree>
+      <p:nvGrpSpPr>
+        <p:cNvPr id="1" name=""/>
+        <p:cNvGrpSpPr/>
+        <p:nvPr/>
+      </p:nvGrpSpPr>
+      <p:grpSpPr>
+        <a:xfrm>
+          <a:off x="0" y="0"/>
+          <a:ext cx="0" cy="0"/>
+          <a:chOff x="0" y="0"/>
+          <a:chExt cx="0" cy="0"/>
+        </a:xfrm>
+      </p:grpSpPr>
+      <p:sp>
+        <p:nvSpPr>
+          <p:cNvPr id="2" name="Title 1"/>
+          <p:cNvSpPr>
+            <a:spLocks noGrp="1"/>
+          </p:cNvSpPr>
+          <p:nvPr>
+            <p:ph type="title"/>
+          </p:nvPr>
+        </p:nvSpPr>
+        <p:spPr/>
+        <p:txBody>
+          <a:bodyPr>
+            <a:normAutofit/>
+          </a:bodyPr>
+          <a:lstStyle/>
+          <a:p>
+            <a:pPr algn="ctr">
+              <a:lnSpc>
+                <a:spcPct val="100000"/>
+              </a:lnSpc>
+              <a:spcBef>
+                <a:spcPts val="0"/>
+              </a:spcBef>
+            </a:pPr>
+            <a:r>
+              <a:rPr lang="en-US" sz="4000" b="1" smtClean="0"/>
+              <a:t>KẾT LUẬN VÀ HƯỚNG PHÁT TRIỂN</a:t>
+            </a:r>
+            <a:endParaRPr lang="vi-VN" sz="4000" b="1"/>
+          </a:p>
+        </p:txBody>
+      </p:sp>
+      <p:sp>
+        <p:nvSpPr>
+          <p:cNvPr id="12" name="Content Placeholder 11"/>
+          <p:cNvSpPr>
+            <a:spLocks noGrp="1"/>
+          </p:cNvSpPr>
+          <p:nvPr>
+            <p:ph idx="1"/>
+          </p:nvPr>
+        </p:nvSpPr>
+        <p:spPr>
+          <a:xfrm>
+            <a:off x="838200" y="1825624"/>
+            <a:ext cx="10515600" cy="4964282"/>
+          </a:xfrm>
+        </p:spPr>
+        <p:txBody>
+          <a:bodyPr>
+            <a:normAutofit/>
+          </a:bodyPr>
+          <a:lstStyle/>
           <a:p>
             <a:pPr>
               <a:buFont typeface="Wingdings" panose="05000000000000000000" pitchFamily="2" charset="2"/>
               <a:buChar char="q"/>
             </a:pPr>
             <a:r>
-              <a:rPr lang="vi-VN" sz="3000" b="1" smtClean="0"/>
-              <a:t>Xây dựng thành công ứng dụng</a:t>
+              <a:rPr lang="vi-VN" smtClean="0"/>
+              <a:t> </a:t>
+            </a:r>
+            <a:r>
+              <a:rPr lang="vi-VN" b="1" smtClean="0"/>
+              <a:t>Kết luận</a:t>
+            </a:r>
+          </a:p>
+          <a:p>
+            <a:pPr marL="673200" indent="-457200">
+              <a:lnSpc>
+                <a:spcPct val="150000"/>
+              </a:lnSpc>
+              <a:spcBef>
+                <a:spcPts val="0"/>
+              </a:spcBef>
+              <a:buFont typeface="Wingdings" panose="05000000000000000000" pitchFamily="2" charset="2"/>
+              <a:buChar char="ü"/>
+            </a:pPr>
+            <a:r>
+              <a:rPr lang="vi-VN" sz="3000" smtClean="0"/>
+              <a:t>Ứng dụng đáp ứng các yêu cầu chức năng</a:t>
+            </a:r>
+          </a:p>
+          <a:p>
+            <a:pPr marL="673200" indent="-457200">
+              <a:lnSpc>
+                <a:spcPct val="150000"/>
+              </a:lnSpc>
+              <a:spcBef>
+                <a:spcPts val="0"/>
+              </a:spcBef>
+              <a:buFont typeface="Wingdings" panose="05000000000000000000" pitchFamily="2" charset="2"/>
+              <a:buChar char="ü"/>
+            </a:pPr>
+            <a:r>
+              <a:rPr lang="vi-VN" sz="3000" smtClean="0"/>
+              <a:t>Các thao tác h</a:t>
+            </a:r>
+            <a:r>
+              <a:rPr lang="vi-VN" sz="3000" smtClean="0"/>
+              <a:t>oạt động ổn định</a:t>
+            </a:r>
+          </a:p>
+          <a:p>
+            <a:pPr marL="673200" indent="-457200">
+              <a:lnSpc>
+                <a:spcPct val="150000"/>
+              </a:lnSpc>
+              <a:spcBef>
+                <a:spcPts val="0"/>
+              </a:spcBef>
+              <a:buFont typeface="Wingdings" panose="05000000000000000000" pitchFamily="2" charset="2"/>
+              <a:buChar char="ü"/>
+            </a:pPr>
+            <a:r>
+              <a:rPr lang="vi-VN" sz="3000" smtClean="0"/>
+              <a:t>Cấu trúc ứng dụng rõ ràng và dễ bảo trì</a:t>
+            </a:r>
+            <a:endParaRPr lang="vi-VN" sz="3000"/>
+          </a:p>
+          <a:p>
+            <a:pPr marL="673200" indent="-457200">
+              <a:lnSpc>
+                <a:spcPct val="150000"/>
+              </a:lnSpc>
+              <a:spcBef>
+                <a:spcPts val="0"/>
+              </a:spcBef>
+              <a:buFont typeface="Wingdings" panose="05000000000000000000" pitchFamily="2" charset="2"/>
+              <a:buChar char="ü"/>
+            </a:pPr>
+            <a:r>
+              <a:rPr lang="vi-VN" sz="3000" smtClean="0"/>
+              <a:t>Khó tiếp cận với người dùng</a:t>
+            </a:r>
+          </a:p>
+          <a:p>
+            <a:pPr marL="673200" indent="-457200">
+              <a:lnSpc>
+                <a:spcPct val="150000"/>
+              </a:lnSpc>
+              <a:spcBef>
+                <a:spcPts val="0"/>
+              </a:spcBef>
+              <a:buFont typeface="Wingdings" panose="05000000000000000000" pitchFamily="2" charset="2"/>
+              <a:buChar char="ü"/>
+            </a:pPr>
+            <a:r>
+              <a:rPr lang="vi-VN" sz="3000" smtClean="0"/>
+              <a:t>Khả năng tương tác hạn chế</a:t>
+            </a:r>
+          </a:p>
+          <a:p>
+            <a:pPr marL="673200" indent="-457200">
+              <a:lnSpc>
+                <a:spcPct val="150000"/>
+              </a:lnSpc>
+              <a:spcBef>
+                <a:spcPts val="0"/>
+              </a:spcBef>
+              <a:buFont typeface="Wingdings" panose="05000000000000000000" pitchFamily="2" charset="2"/>
+              <a:buChar char="ü"/>
+            </a:pPr>
+            <a:r>
+              <a:rPr lang="vi-VN" sz="3000" smtClean="0"/>
+              <a:t>Giao diện đơn giản và kém thân thiện</a:t>
             </a:r>
           </a:p>
         </p:txBody>
@@ -5274,7 +6080,7 @@
     </p:spTree>
     <p:extLst>
       <p:ext uri="{BB962C8B-B14F-4D97-AF65-F5344CB8AC3E}">
-        <p14:creationId xmlns:p14="http://schemas.microsoft.com/office/powerpoint/2010/main" val="1695831539"/>
+        <p14:creationId xmlns:p14="http://schemas.microsoft.com/office/powerpoint/2010/main" val="3755467078"/>
       </p:ext>
     </p:extLst>
   </p:cSld>

</xml_diff>